<commit_message>
Inclusão de telas de cadastro e login
Incluído tela de cadastro com funcionalidades de validação e login, também com funcionalidades e validações.
</commit_message>
<xml_diff>
--- a/docs/apoio.pptx
+++ b/docs/apoio.pptx
@@ -104,6 +104,11 @@
       </a:defRPr>
     </a:lvl9pPr>
   </p:defaultTextStyle>
+  <p:extLst>
+    <p:ext uri="{EFAFB233-063F-42B5-8137-9DF3F51BA10A}">
+      <p15:sldGuideLst xmlns:p15="http://schemas.microsoft.com/office/powerpoint/2012/main"/>
+    </p:ext>
+  </p:extLst>
 </p:presentation>
 </file>
 
@@ -254,7 +259,7 @@
           <a:p>
             <a:fld id="{768E48CF-0723-4B1D-AB4B-440BD288D2E1}" type="datetimeFigureOut">
               <a:rPr lang="pt-BR" smtClean="0"/>
-              <a:t>25/10/2021</a:t>
+              <a:t>08/11/2021</a:t>
             </a:fld>
             <a:endParaRPr lang="pt-BR"/>
           </a:p>
@@ -452,7 +457,7 @@
           <a:p>
             <a:fld id="{768E48CF-0723-4B1D-AB4B-440BD288D2E1}" type="datetimeFigureOut">
               <a:rPr lang="pt-BR" smtClean="0"/>
-              <a:t>25/10/2021</a:t>
+              <a:t>08/11/2021</a:t>
             </a:fld>
             <a:endParaRPr lang="pt-BR"/>
           </a:p>
@@ -660,7 +665,7 @@
           <a:p>
             <a:fld id="{768E48CF-0723-4B1D-AB4B-440BD288D2E1}" type="datetimeFigureOut">
               <a:rPr lang="pt-BR" smtClean="0"/>
-              <a:t>25/10/2021</a:t>
+              <a:t>08/11/2021</a:t>
             </a:fld>
             <a:endParaRPr lang="pt-BR"/>
           </a:p>
@@ -858,7 +863,7 @@
           <a:p>
             <a:fld id="{768E48CF-0723-4B1D-AB4B-440BD288D2E1}" type="datetimeFigureOut">
               <a:rPr lang="pt-BR" smtClean="0"/>
-              <a:t>25/10/2021</a:t>
+              <a:t>08/11/2021</a:t>
             </a:fld>
             <a:endParaRPr lang="pt-BR"/>
           </a:p>
@@ -1133,7 +1138,7 @@
           <a:p>
             <a:fld id="{768E48CF-0723-4B1D-AB4B-440BD288D2E1}" type="datetimeFigureOut">
               <a:rPr lang="pt-BR" smtClean="0"/>
-              <a:t>25/10/2021</a:t>
+              <a:t>08/11/2021</a:t>
             </a:fld>
             <a:endParaRPr lang="pt-BR"/>
           </a:p>
@@ -1398,7 +1403,7 @@
           <a:p>
             <a:fld id="{768E48CF-0723-4B1D-AB4B-440BD288D2E1}" type="datetimeFigureOut">
               <a:rPr lang="pt-BR" smtClean="0"/>
-              <a:t>25/10/2021</a:t>
+              <a:t>08/11/2021</a:t>
             </a:fld>
             <a:endParaRPr lang="pt-BR"/>
           </a:p>
@@ -1810,7 +1815,7 @@
           <a:p>
             <a:fld id="{768E48CF-0723-4B1D-AB4B-440BD288D2E1}" type="datetimeFigureOut">
               <a:rPr lang="pt-BR" smtClean="0"/>
-              <a:t>25/10/2021</a:t>
+              <a:t>08/11/2021</a:t>
             </a:fld>
             <a:endParaRPr lang="pt-BR"/>
           </a:p>
@@ -1951,7 +1956,7 @@
           <a:p>
             <a:fld id="{768E48CF-0723-4B1D-AB4B-440BD288D2E1}" type="datetimeFigureOut">
               <a:rPr lang="pt-BR" smtClean="0"/>
-              <a:t>25/10/2021</a:t>
+              <a:t>08/11/2021</a:t>
             </a:fld>
             <a:endParaRPr lang="pt-BR"/>
           </a:p>
@@ -2064,7 +2069,7 @@
           <a:p>
             <a:fld id="{768E48CF-0723-4B1D-AB4B-440BD288D2E1}" type="datetimeFigureOut">
               <a:rPr lang="pt-BR" smtClean="0"/>
-              <a:t>25/10/2021</a:t>
+              <a:t>08/11/2021</a:t>
             </a:fld>
             <a:endParaRPr lang="pt-BR"/>
           </a:p>
@@ -2375,7 +2380,7 @@
           <a:p>
             <a:fld id="{768E48CF-0723-4B1D-AB4B-440BD288D2E1}" type="datetimeFigureOut">
               <a:rPr lang="pt-BR" smtClean="0"/>
-              <a:t>25/10/2021</a:t>
+              <a:t>08/11/2021</a:t>
             </a:fld>
             <a:endParaRPr lang="pt-BR"/>
           </a:p>
@@ -2663,7 +2668,7 @@
           <a:p>
             <a:fld id="{768E48CF-0723-4B1D-AB4B-440BD288D2E1}" type="datetimeFigureOut">
               <a:rPr lang="pt-BR" smtClean="0"/>
-              <a:t>25/10/2021</a:t>
+              <a:t>08/11/2021</a:t>
             </a:fld>
             <a:endParaRPr lang="pt-BR"/>
           </a:p>
@@ -2904,7 +2909,7 @@
           <a:p>
             <a:fld id="{768E48CF-0723-4B1D-AB4B-440BD288D2E1}" type="datetimeFigureOut">
               <a:rPr lang="pt-BR" smtClean="0"/>
-              <a:t>25/10/2021</a:t>
+              <a:t>08/11/2021</a:t>
             </a:fld>
             <a:endParaRPr lang="pt-BR"/>
           </a:p>
@@ -3376,6 +3381,41 @@
           </a:p>
         </p:txBody>
       </p:sp>
+      <p:pic>
+        <p:nvPicPr>
+          <p:cNvPr id="3" name="Imagem 2" descr="Uma imagem contendo Gráfico&#10;&#10;Descrição gerada automaticamente">
+            <a:extLst>
+              <a:ext uri="{FF2B5EF4-FFF2-40B4-BE49-F238E27FC236}">
+                <a16:creationId xmlns:a16="http://schemas.microsoft.com/office/drawing/2014/main" id="{20DA70CF-A391-40F4-BD3D-EC4AFC804BC1}"/>
+              </a:ext>
+            </a:extLst>
+          </p:cNvPr>
+          <p:cNvPicPr>
+            <a:picLocks noChangeAspect="1"/>
+          </p:cNvPicPr>
+          <p:nvPr/>
+        </p:nvPicPr>
+        <p:blipFill rotWithShape="1">
+          <a:blip r:embed="rId2">
+            <a:extLst>
+              <a:ext uri="{28A0092B-C50C-407E-A947-70E740481C1C}">
+                <a14:useLocalDpi xmlns:a14="http://schemas.microsoft.com/office/drawing/2010/main" val="0"/>
+              </a:ext>
+            </a:extLst>
+          </a:blip>
+          <a:srcRect t="20708"/>
+          <a:stretch/>
+        </p:blipFill>
+        <p:spPr>
+          <a:xfrm>
+            <a:off x="2414339" y="4107766"/>
+            <a:ext cx="1638384" cy="1173224"/>
+          </a:xfrm>
+          <a:prstGeom prst="rect">
+            <a:avLst/>
+          </a:prstGeom>
+        </p:spPr>
+      </p:pic>
     </p:spTree>
     <p:extLst>
       <p:ext uri="{BB962C8B-B14F-4D97-AF65-F5344CB8AC3E}">

</xml_diff>